<commit_message>
changes in distribution vs allocation
</commit_message>
<xml_diff>
--- a/alyssia/project5_intro.pptx
+++ b/alyssia/project5_intro.pptx
@@ -17392,7 +17392,7 @@
                   <a:schemeClr val="bg1"/>
                 </a:solidFill>
               </a:rPr>
-              <a:t>Federal Distribution</a:t>
+              <a:t>Federal Allocation</a:t>
             </a:r>
           </a:p>
           <a:p>
@@ -17694,7 +17694,7 @@
                   <a:schemeClr val="bg1"/>
                 </a:solidFill>
               </a:rPr>
-              <a:t>State Administration</a:t>
+              <a:t>State Distribution</a:t>
             </a:r>
           </a:p>
           <a:p>

</xml_diff>